<commit_message>
completed Simone's version of the paper, going back to Carlo
</commit_message>
<xml_diff>
--- a/TeXFiles/Figs/FigChainG.pptx
+++ b/TeXFiles/Figs/FigChainG.pptx
@@ -7,7 +7,7 @@
   <p:sldIdLst>
     <p:sldId id="256" r:id="rId2"/>
   </p:sldIdLst>
-  <p:sldSz cx="9144000" cy="6858000" type="screen4x3"/>
+  <p:sldSz cx="9144000" cy="5761038"/>
   <p:notesSz cx="6858000" cy="9144000"/>
   <p:defaultTextStyle>
     <a:defPPr>
@@ -136,8 +136,8 @@
         </p:nvSpPr>
         <p:spPr>
           <a:xfrm>
-            <a:off x="685800" y="2130425"/>
-            <a:ext cx="7772400" cy="1470025"/>
+            <a:off x="685800" y="1789656"/>
+            <a:ext cx="7772400" cy="1234889"/>
           </a:xfrm>
         </p:spPr>
         <p:txBody>
@@ -164,8 +164,8 @@
         </p:nvSpPr>
         <p:spPr>
           <a:xfrm>
-            <a:off x="1371600" y="3886200"/>
-            <a:ext cx="6400800" cy="1752600"/>
+            <a:off x="1371600" y="3264588"/>
+            <a:ext cx="6400800" cy="1472265"/>
           </a:xfrm>
         </p:spPr>
         <p:txBody>
@@ -288,7 +288,7 @@
           <a:p>
             <a:fld id="{968D63B1-CAD2-4739-8FC5-501D0C90E3C3}" type="datetimeFigureOut">
               <a:rPr lang="en-GB" smtClean="0"/>
-              <a:t>19/08/2015</a:t>
+              <a:t>20/08/2015</a:t>
             </a:fld>
             <a:endParaRPr lang="en-GB"/>
           </a:p>
@@ -458,7 +458,7 @@
           <a:p>
             <a:fld id="{968D63B1-CAD2-4739-8FC5-501D0C90E3C3}" type="datetimeFigureOut">
               <a:rPr lang="en-GB" smtClean="0"/>
-              <a:t>19/08/2015</a:t>
+              <a:t>20/08/2015</a:t>
             </a:fld>
             <a:endParaRPr lang="en-GB"/>
           </a:p>
@@ -548,8 +548,8 @@
         </p:nvSpPr>
         <p:spPr>
           <a:xfrm>
-            <a:off x="6629400" y="274638"/>
-            <a:ext cx="2057400" cy="5851525"/>
+            <a:off x="6629400" y="230709"/>
+            <a:ext cx="2057400" cy="4915552"/>
           </a:xfrm>
         </p:spPr>
         <p:txBody>
@@ -576,8 +576,8 @@
         </p:nvSpPr>
         <p:spPr>
           <a:xfrm>
-            <a:off x="457200" y="274638"/>
-            <a:ext cx="6019800" cy="5851525"/>
+            <a:off x="457200" y="230709"/>
+            <a:ext cx="6019800" cy="4915552"/>
           </a:xfrm>
         </p:spPr>
         <p:txBody>
@@ -638,7 +638,7 @@
           <a:p>
             <a:fld id="{968D63B1-CAD2-4739-8FC5-501D0C90E3C3}" type="datetimeFigureOut">
               <a:rPr lang="en-GB" smtClean="0"/>
-              <a:t>19/08/2015</a:t>
+              <a:t>20/08/2015</a:t>
             </a:fld>
             <a:endParaRPr lang="en-GB"/>
           </a:p>
@@ -808,7 +808,7 @@
           <a:p>
             <a:fld id="{968D63B1-CAD2-4739-8FC5-501D0C90E3C3}" type="datetimeFigureOut">
               <a:rPr lang="en-GB" smtClean="0"/>
-              <a:t>19/08/2015</a:t>
+              <a:t>20/08/2015</a:t>
             </a:fld>
             <a:endParaRPr lang="en-GB"/>
           </a:p>
@@ -898,8 +898,8 @@
         </p:nvSpPr>
         <p:spPr>
           <a:xfrm>
-            <a:off x="722313" y="4406900"/>
-            <a:ext cx="7772400" cy="1362075"/>
+            <a:off x="722313" y="3702001"/>
+            <a:ext cx="7772400" cy="1144206"/>
           </a:xfrm>
         </p:spPr>
         <p:txBody>
@@ -930,8 +930,8 @@
         </p:nvSpPr>
         <p:spPr>
           <a:xfrm>
-            <a:off x="722313" y="2906713"/>
-            <a:ext cx="7772400" cy="1500187"/>
+            <a:off x="722313" y="2441774"/>
+            <a:ext cx="7772400" cy="1260227"/>
           </a:xfrm>
         </p:spPr>
         <p:txBody>
@@ -1054,7 +1054,7 @@
           <a:p>
             <a:fld id="{968D63B1-CAD2-4739-8FC5-501D0C90E3C3}" type="datetimeFigureOut">
               <a:rPr lang="en-GB" smtClean="0"/>
-              <a:t>19/08/2015</a:t>
+              <a:t>20/08/2015</a:t>
             </a:fld>
             <a:endParaRPr lang="en-GB"/>
           </a:p>
@@ -1167,8 +1167,8 @@
         </p:nvSpPr>
         <p:spPr>
           <a:xfrm>
-            <a:off x="457200" y="1600200"/>
-            <a:ext cx="4038600" cy="4525963"/>
+            <a:off x="457200" y="1344243"/>
+            <a:ext cx="4038600" cy="3802019"/>
           </a:xfrm>
         </p:spPr>
         <p:txBody>
@@ -1252,8 +1252,8 @@
         </p:nvSpPr>
         <p:spPr>
           <a:xfrm>
-            <a:off x="4648200" y="1600200"/>
-            <a:ext cx="4038600" cy="4525963"/>
+            <a:off x="4648200" y="1344243"/>
+            <a:ext cx="4038600" cy="3802019"/>
           </a:xfrm>
         </p:spPr>
         <p:txBody>
@@ -1342,7 +1342,7 @@
           <a:p>
             <a:fld id="{968D63B1-CAD2-4739-8FC5-501D0C90E3C3}" type="datetimeFigureOut">
               <a:rPr lang="en-GB" smtClean="0"/>
-              <a:t>19/08/2015</a:t>
+              <a:t>20/08/2015</a:t>
             </a:fld>
             <a:endParaRPr lang="en-GB"/>
           </a:p>
@@ -1459,8 +1459,8 @@
         </p:nvSpPr>
         <p:spPr>
           <a:xfrm>
-            <a:off x="457200" y="1535113"/>
-            <a:ext cx="4040188" cy="639762"/>
+            <a:off x="457200" y="1289566"/>
+            <a:ext cx="4040188" cy="537430"/>
           </a:xfrm>
         </p:spPr>
         <p:txBody>
@@ -1524,8 +1524,8 @@
         </p:nvSpPr>
         <p:spPr>
           <a:xfrm>
-            <a:off x="457200" y="2174875"/>
-            <a:ext cx="4040188" cy="3951288"/>
+            <a:off x="457200" y="1826996"/>
+            <a:ext cx="4040188" cy="3319265"/>
           </a:xfrm>
         </p:spPr>
         <p:txBody>
@@ -1609,8 +1609,8 @@
         </p:nvSpPr>
         <p:spPr>
           <a:xfrm>
-            <a:off x="4645025" y="1535113"/>
-            <a:ext cx="4041775" cy="639762"/>
+            <a:off x="4645026" y="1289566"/>
+            <a:ext cx="4041775" cy="537430"/>
           </a:xfrm>
         </p:spPr>
         <p:txBody>
@@ -1674,8 +1674,8 @@
         </p:nvSpPr>
         <p:spPr>
           <a:xfrm>
-            <a:off x="4645025" y="2174875"/>
-            <a:ext cx="4041775" cy="3951288"/>
+            <a:off x="4645026" y="1826996"/>
+            <a:ext cx="4041775" cy="3319265"/>
           </a:xfrm>
         </p:spPr>
         <p:txBody>
@@ -1764,7 +1764,7 @@
           <a:p>
             <a:fld id="{968D63B1-CAD2-4739-8FC5-501D0C90E3C3}" type="datetimeFigureOut">
               <a:rPr lang="en-GB" smtClean="0"/>
-              <a:t>19/08/2015</a:t>
+              <a:t>20/08/2015</a:t>
             </a:fld>
             <a:endParaRPr lang="en-GB"/>
           </a:p>
@@ -1882,7 +1882,7 @@
           <a:p>
             <a:fld id="{968D63B1-CAD2-4739-8FC5-501D0C90E3C3}" type="datetimeFigureOut">
               <a:rPr lang="en-GB" smtClean="0"/>
-              <a:t>19/08/2015</a:t>
+              <a:t>20/08/2015</a:t>
             </a:fld>
             <a:endParaRPr lang="en-GB"/>
           </a:p>
@@ -1977,7 +1977,7 @@
           <a:p>
             <a:fld id="{968D63B1-CAD2-4739-8FC5-501D0C90E3C3}" type="datetimeFigureOut">
               <a:rPr lang="en-GB" smtClean="0"/>
-              <a:t>19/08/2015</a:t>
+              <a:t>20/08/2015</a:t>
             </a:fld>
             <a:endParaRPr lang="en-GB"/>
           </a:p>
@@ -2067,8 +2067,8 @@
         </p:nvSpPr>
         <p:spPr>
           <a:xfrm>
-            <a:off x="457200" y="273050"/>
-            <a:ext cx="3008313" cy="1162050"/>
+            <a:off x="457201" y="229375"/>
+            <a:ext cx="3008313" cy="976176"/>
           </a:xfrm>
         </p:spPr>
         <p:txBody>
@@ -2099,8 +2099,8 @@
         </p:nvSpPr>
         <p:spPr>
           <a:xfrm>
-            <a:off x="3575050" y="273050"/>
-            <a:ext cx="5111750" cy="5853113"/>
+            <a:off x="3575050" y="229375"/>
+            <a:ext cx="5111750" cy="4916886"/>
           </a:xfrm>
         </p:spPr>
         <p:txBody>
@@ -2184,8 +2184,8 @@
         </p:nvSpPr>
         <p:spPr>
           <a:xfrm>
-            <a:off x="457200" y="1435100"/>
-            <a:ext cx="3008313" cy="4691063"/>
+            <a:off x="457201" y="1205551"/>
+            <a:ext cx="3008313" cy="3940710"/>
           </a:xfrm>
         </p:spPr>
         <p:txBody>
@@ -2254,7 +2254,7 @@
           <a:p>
             <a:fld id="{968D63B1-CAD2-4739-8FC5-501D0C90E3C3}" type="datetimeFigureOut">
               <a:rPr lang="en-GB" smtClean="0"/>
-              <a:t>19/08/2015</a:t>
+              <a:t>20/08/2015</a:t>
             </a:fld>
             <a:endParaRPr lang="en-GB"/>
           </a:p>
@@ -2344,8 +2344,8 @@
         </p:nvSpPr>
         <p:spPr>
           <a:xfrm>
-            <a:off x="1792288" y="4800600"/>
-            <a:ext cx="5486400" cy="566738"/>
+            <a:off x="1792288" y="4032727"/>
+            <a:ext cx="5486400" cy="476086"/>
           </a:xfrm>
         </p:spPr>
         <p:txBody>
@@ -2376,8 +2376,8 @@
         </p:nvSpPr>
         <p:spPr>
           <a:xfrm>
-            <a:off x="1792288" y="612775"/>
-            <a:ext cx="5486400" cy="4114800"/>
+            <a:off x="1792288" y="514759"/>
+            <a:ext cx="5486400" cy="3456623"/>
           </a:xfrm>
         </p:spPr>
         <p:txBody>
@@ -2437,8 +2437,8 @@
         </p:nvSpPr>
         <p:spPr>
           <a:xfrm>
-            <a:off x="1792288" y="5367338"/>
-            <a:ext cx="5486400" cy="804862"/>
+            <a:off x="1792288" y="4508813"/>
+            <a:ext cx="5486400" cy="676121"/>
           </a:xfrm>
         </p:spPr>
         <p:txBody>
@@ -2507,7 +2507,7 @@
           <a:p>
             <a:fld id="{968D63B1-CAD2-4739-8FC5-501D0C90E3C3}" type="datetimeFigureOut">
               <a:rPr lang="en-GB" smtClean="0"/>
-              <a:t>19/08/2015</a:t>
+              <a:t>20/08/2015</a:t>
             </a:fld>
             <a:endParaRPr lang="en-GB"/>
           </a:p>
@@ -2602,8 +2602,8 @@
         </p:nvSpPr>
         <p:spPr>
           <a:xfrm>
-            <a:off x="457200" y="274638"/>
-            <a:ext cx="8229600" cy="1143000"/>
+            <a:off x="457200" y="230709"/>
+            <a:ext cx="8229600" cy="960173"/>
           </a:xfrm>
           <a:prstGeom prst="rect">
             <a:avLst/>
@@ -2635,8 +2635,8 @@
         </p:nvSpPr>
         <p:spPr>
           <a:xfrm>
-            <a:off x="457200" y="1600200"/>
-            <a:ext cx="8229600" cy="4525963"/>
+            <a:off x="457200" y="1344243"/>
+            <a:ext cx="8229600" cy="3802019"/>
           </a:xfrm>
           <a:prstGeom prst="rect">
             <a:avLst/>
@@ -2697,8 +2697,8 @@
         </p:nvSpPr>
         <p:spPr>
           <a:xfrm>
-            <a:off x="457200" y="6356350"/>
-            <a:ext cx="2133600" cy="365125"/>
+            <a:off x="457200" y="5339629"/>
+            <a:ext cx="2133600" cy="306722"/>
           </a:xfrm>
           <a:prstGeom prst="rect">
             <a:avLst/>
@@ -2720,7 +2720,7 @@
           <a:p>
             <a:fld id="{968D63B1-CAD2-4739-8FC5-501D0C90E3C3}" type="datetimeFigureOut">
               <a:rPr lang="en-GB" smtClean="0"/>
-              <a:t>19/08/2015</a:t>
+              <a:t>20/08/2015</a:t>
             </a:fld>
             <a:endParaRPr lang="en-GB"/>
           </a:p>
@@ -2738,8 +2738,8 @@
         </p:nvSpPr>
         <p:spPr>
           <a:xfrm>
-            <a:off x="3124200" y="6356350"/>
-            <a:ext cx="2895600" cy="365125"/>
+            <a:off x="3124200" y="5339629"/>
+            <a:ext cx="2895600" cy="306722"/>
           </a:xfrm>
           <a:prstGeom prst="rect">
             <a:avLst/>
@@ -2775,8 +2775,8 @@
         </p:nvSpPr>
         <p:spPr>
           <a:xfrm>
-            <a:off x="6553200" y="6356350"/>
-            <a:ext cx="2133600" cy="365125"/>
+            <a:off x="6553200" y="5339629"/>
+            <a:ext cx="2133600" cy="306722"/>
           </a:xfrm>
           <a:prstGeom prst="rect">
             <a:avLst/>
@@ -3103,8 +3103,8 @@
         </p:nvSpPr>
         <p:spPr>
           <a:xfrm>
-            <a:off x="4649060" y="152636"/>
-            <a:ext cx="4176464" cy="2664296"/>
+            <a:off x="4649060" y="128221"/>
+            <a:ext cx="4176464" cy="2238132"/>
           </a:xfrm>
           <a:prstGeom prst="rect">
             <a:avLst/>
@@ -3149,7 +3149,7 @@
         </p:nvSpPr>
         <p:spPr>
           <a:xfrm>
-            <a:off x="2899802" y="5821278"/>
+            <a:off x="2899802" y="5184691"/>
             <a:ext cx="4624526" cy="553998"/>
           </a:xfrm>
           <a:prstGeom prst="rect">
@@ -3171,36 +3171,6 @@
           </a:p>
         </p:txBody>
       </p:sp>
-      <p:pic>
-        <p:nvPicPr>
-          <p:cNvPr id="13" name="Picture 12"/>
-          <p:cNvPicPr>
-            <a:picLocks noChangeAspect="1"/>
-          </p:cNvPicPr>
-          <p:nvPr/>
-        </p:nvPicPr>
-        <p:blipFill>
-          <a:blip r:embed="rId2">
-            <a:extLst>
-              <a:ext uri="{28A0092B-C50C-407E-A947-70E740481C1C}">
-                <a14:useLocalDpi xmlns:a14="http://schemas.microsoft.com/office/drawing/2010/main" val="0"/>
-              </a:ext>
-            </a:extLst>
-          </a:blip>
-          <a:stretch>
-            <a:fillRect/>
-          </a:stretch>
-        </p:blipFill>
-        <p:spPr>
-          <a:xfrm>
-            <a:off x="656650" y="635508"/>
-            <a:ext cx="8487349" cy="5185770"/>
-          </a:xfrm>
-          <a:prstGeom prst="rect">
-            <a:avLst/>
-          </a:prstGeom>
-        </p:spPr>
-      </p:pic>
       <p:pic>
         <p:nvPicPr>
           <p:cNvPr id="1026" name="Picture 2"/>
@@ -3210,7 +3180,7 @@
           <p:nvPr/>
         </p:nvPicPr>
         <p:blipFill>
-          <a:blip r:embed="rId3">
+          <a:blip r:embed="rId2">
             <a:extLst>
               <a:ext uri="{28A0092B-C50C-407E-A947-70E740481C1C}">
                 <a14:useLocalDpi xmlns:a14="http://schemas.microsoft.com/office/drawing/2010/main" val="0"/>
@@ -3224,8 +3194,8 @@
         </p:blipFill>
         <p:spPr bwMode="auto">
           <a:xfrm rot="16200000">
-            <a:off x="132048" y="2932246"/>
-            <a:ext cx="456911" cy="592292"/>
+            <a:off x="168591" y="2415853"/>
+            <a:ext cx="383826" cy="592292"/>
           </a:xfrm>
           <a:prstGeom prst="rect">
             <a:avLst/>
@@ -3253,6 +3223,36 @@
               </a14:hiddenLine>
             </a:ext>
           </a:extLst>
+        </p:spPr>
+      </p:pic>
+      <p:pic>
+        <p:nvPicPr>
+          <p:cNvPr id="2" name="Picture 1"/>
+          <p:cNvPicPr>
+            <a:picLocks noChangeAspect="1"/>
+          </p:cNvPicPr>
+          <p:nvPr/>
+        </p:nvPicPr>
+        <p:blipFill>
+          <a:blip r:embed="rId3">
+            <a:extLst>
+              <a:ext uri="{28A0092B-C50C-407E-A947-70E740481C1C}">
+                <a14:useLocalDpi xmlns:a14="http://schemas.microsoft.com/office/drawing/2010/main" val="0"/>
+              </a:ext>
+            </a:extLst>
+          </a:blip>
+          <a:stretch>
+            <a:fillRect/>
+          </a:stretch>
+        </p:blipFill>
+        <p:spPr>
+          <a:xfrm>
+            <a:off x="700918" y="128221"/>
+            <a:ext cx="8355774" cy="5105378"/>
+          </a:xfrm>
+          <a:prstGeom prst="rect">
+            <a:avLst/>
+          </a:prstGeom>
         </p:spPr>
       </p:pic>
     </p:spTree>

</xml_diff>